<commit_message>
Project Presentation added, needs finishing and a couple more slides
</commit_message>
<xml_diff>
--- a/BU_PowerPoint_template_4_3.pptx
+++ b/BU_PowerPoint_template_4_3.pptx
@@ -1,18 +1,23 @@
 
 <file path=ppt/presentation.xml><?xml version="1.0" encoding="utf-8"?>
-<p:presentation xmlns:a="http://schemas.openxmlformats.org/drawingml/2006/main" xmlns:r="http://schemas.openxmlformats.org/officeDocument/2006/relationships" xmlns:p="http://schemas.openxmlformats.org/presentationml/2006/main" showSpecialPlsOnTitleSld="0" compatMode="1" strictFirstAndLastChars="0" saveSubsetFonts="1" autoCompressPictures="0">
+<p:presentation xmlns:a="http://schemas.openxmlformats.org/drawingml/2006/main" xmlns:r="http://schemas.openxmlformats.org/officeDocument/2006/relationships" xmlns:p="http://schemas.openxmlformats.org/presentationml/2006/main" showSpecialPlsOnTitleSld="0" strictFirstAndLastChars="0" saveSubsetFonts="1" autoCompressPictures="0">
   <p:sldMasterIdLst>
     <p:sldMasterId id="2147483648" r:id="rId1"/>
   </p:sldMasterIdLst>
   <p:notesMasterIdLst>
-    <p:notesMasterId r:id="rId4"/>
+    <p:notesMasterId r:id="rId9"/>
   </p:notesMasterIdLst>
   <p:handoutMasterIdLst>
-    <p:handoutMasterId r:id="rId5"/>
+    <p:handoutMasterId r:id="rId10"/>
   </p:handoutMasterIdLst>
   <p:sldIdLst>
     <p:sldId id="256" r:id="rId2"/>
     <p:sldId id="257" r:id="rId3"/>
+    <p:sldId id="260" r:id="rId4"/>
+    <p:sldId id="258" r:id="rId5"/>
+    <p:sldId id="259" r:id="rId6"/>
+    <p:sldId id="261" r:id="rId7"/>
+    <p:sldId id="262" r:id="rId8"/>
   </p:sldIdLst>
   <p:sldSz cx="9144000" cy="6858000" type="screen4x3"/>
   <p:notesSz cx="6858000" cy="9144000"/>
@@ -1409,6 +1414,96 @@
 </p:notes>
 </file>
 
+<file path=ppt/notesSlides/notesSlide3.xml><?xml version="1.0" encoding="utf-8"?>
+<p:notes xmlns:a="http://schemas.openxmlformats.org/drawingml/2006/main" xmlns:r="http://schemas.openxmlformats.org/officeDocument/2006/relationships" xmlns:p="http://schemas.openxmlformats.org/presentationml/2006/main">
+  <p:cSld>
+    <p:spTree>
+      <p:nvGrpSpPr>
+        <p:cNvPr id="1" name=""/>
+        <p:cNvGrpSpPr/>
+        <p:nvPr/>
+      </p:nvGrpSpPr>
+      <p:grpSpPr>
+        <a:xfrm>
+          <a:off x="0" y="0"/>
+          <a:ext cx="0" cy="0"/>
+          <a:chOff x="0" y="0"/>
+          <a:chExt cx="0" cy="0"/>
+        </a:xfrm>
+      </p:grpSpPr>
+      <p:sp>
+        <p:nvSpPr>
+          <p:cNvPr id="2" name="Slide Image Placeholder 1"/>
+          <p:cNvSpPr>
+            <a:spLocks noGrp="1" noRot="1" noChangeAspect="1"/>
+          </p:cNvSpPr>
+          <p:nvPr>
+            <p:ph type="sldImg"/>
+          </p:nvPr>
+        </p:nvSpPr>
+        <p:spPr/>
+      </p:sp>
+      <p:sp>
+        <p:nvSpPr>
+          <p:cNvPr id="3" name="Notes Placeholder 2"/>
+          <p:cNvSpPr>
+            <a:spLocks noGrp="1"/>
+          </p:cNvSpPr>
+          <p:nvPr>
+            <p:ph type="body" idx="1"/>
+          </p:nvPr>
+        </p:nvSpPr>
+        <p:spPr/>
+        <p:txBody>
+          <a:bodyPr/>
+          <a:lstStyle/>
+          <a:p>
+            <a:endParaRPr lang="en-US" dirty="0"/>
+          </a:p>
+        </p:txBody>
+      </p:sp>
+      <p:sp>
+        <p:nvSpPr>
+          <p:cNvPr id="4" name="Slide Number Placeholder 3"/>
+          <p:cNvSpPr>
+            <a:spLocks noGrp="1"/>
+          </p:cNvSpPr>
+          <p:nvPr>
+            <p:ph type="sldNum" sz="quarter" idx="5"/>
+          </p:nvPr>
+        </p:nvSpPr>
+        <p:spPr/>
+        <p:txBody>
+          <a:bodyPr/>
+          <a:lstStyle/>
+          <a:p>
+            <a:pPr>
+              <a:defRPr/>
+            </a:pPr>
+            <a:fld id="{DD32FE92-180F-AB42-A5A7-EC0C18110263}" type="slidenum">
+              <a:rPr lang="en-US" altLang="en-US" smtClean="0"/>
+              <a:pPr>
+                <a:defRPr/>
+              </a:pPr>
+              <a:t>3</a:t>
+            </a:fld>
+            <a:endParaRPr lang="en-US" altLang="en-US"/>
+          </a:p>
+        </p:txBody>
+      </p:sp>
+    </p:spTree>
+    <p:extLst>
+      <p:ext uri="{BB962C8B-B14F-4D97-AF65-F5344CB8AC3E}">
+        <p14:creationId xmlns:p14="http://schemas.microsoft.com/office/powerpoint/2010/main" val="870061446"/>
+      </p:ext>
+    </p:extLst>
+  </p:cSld>
+  <p:clrMapOvr>
+    <a:masterClrMapping/>
+  </p:clrMapOvr>
+</p:notes>
+</file>
+
 <file path=ppt/slideLayouts/slideLayout1.xml><?xml version="1.0" encoding="utf-8"?>
 <p:sldLayout xmlns:a="http://schemas.openxmlformats.org/drawingml/2006/main" xmlns:r="http://schemas.openxmlformats.org/officeDocument/2006/relationships" xmlns:p="http://schemas.openxmlformats.org/presentationml/2006/main" showMasterSp="0" type="title" preserve="1">
   <p:cSld name="Title Slide">
@@ -1590,7 +1685,7 @@
         <p:spPr bwMode="auto">
           <a:xfrm>
             <a:off x="609600" y="6172200"/>
-            <a:ext cx="4664075" cy="274638"/>
+            <a:ext cx="4664075" cy="276999"/>
           </a:xfrm>
           <a:prstGeom prst="rect">
             <a:avLst/>
@@ -1652,7 +1747,7 @@
                 <a:latin typeface="Arial" charset="0"/>
                 <a:ea typeface="Osaka" charset="0"/>
               </a:rPr>
-              <a:t> School/college name here</a:t>
+              <a:t> School/Questrom School of Business</a:t>
             </a:r>
           </a:p>
         </p:txBody>
@@ -2061,10 +2156,7 @@
             <a:pPr>
               <a:defRPr/>
             </a:pPr>
-            <a:r>
-              <a:rPr lang="en-US" altLang="en-US"/>
-              <a:t>Trustees Presentation</a:t>
-            </a:r>
+            <a:endParaRPr lang="en-US" altLang="en-US"/>
           </a:p>
         </p:txBody>
       </p:sp>
@@ -2097,17 +2189,9 @@
               <a:defRPr/>
             </a:pPr>
             <a:r>
-              <a:rPr lang="en-US" altLang="en-US"/>
-              <a:t>2/3/08  </a:t>
-            </a:r>
-            <a:fld id="{DDA3C5DD-9D3A-854C-A461-E173D94B9D92}" type="slidenum">
-              <a:rPr lang="en-US" altLang="en-US"/>
-              <a:pPr>
-                <a:defRPr/>
-              </a:pPr>
-              <a:t>‹#›</a:t>
-            </a:fld>
-            <a:endParaRPr lang="en-US" altLang="en-US" baseline="0"/>
+              <a:rPr lang="en-US" altLang="en-US" baseline="0"/>
+              <a:t>Simulation, Pricing and Validation of an Atlas Option</a:t>
+            </a:r>
           </a:p>
         </p:txBody>
       </p:sp>
@@ -2157,7 +2241,7 @@
           <a:lstStyle/>
           <a:p>
             <a:r>
-              <a:rPr lang="en-US"/>
+              <a:rPr lang="en-US" dirty="0"/>
               <a:t>Click to edit Master title style</a:t>
             </a:r>
           </a:p>
@@ -2244,10 +2328,7 @@
             <a:pPr>
               <a:defRPr/>
             </a:pPr>
-            <a:r>
-              <a:rPr lang="en-US" altLang="en-US"/>
-              <a:t>Trustees Presentation</a:t>
-            </a:r>
+            <a:endParaRPr lang="en-US" altLang="en-US" dirty="0"/>
           </a:p>
         </p:txBody>
       </p:sp>
@@ -2282,17 +2363,10 @@
               <a:defRPr/>
             </a:pPr>
             <a:r>
-              <a:rPr lang="en-US" altLang="en-US"/>
-              <a:t>2/3/08  </a:t>
-            </a:r>
-            <a:fld id="{974BEB2B-58CC-EA48-9AEF-C37A7DD0A741}" type="slidenum">
-              <a:rPr lang="en-US" altLang="en-US"/>
-              <a:pPr>
-                <a:defRPr/>
-              </a:pPr>
-              <a:t>‹#›</a:t>
-            </a:fld>
-            <a:endParaRPr lang="en-US" altLang="en-US" baseline="0"/>
+              <a:rPr lang="en-US" altLang="en-US" baseline="0"/>
+              <a:t>Simulation, Pricing and Validation of an Atlas Option</a:t>
+            </a:r>
+            <a:endParaRPr lang="en-US" altLang="en-US" baseline="0" dirty="0"/>
           </a:p>
         </p:txBody>
       </p:sp>
@@ -2452,10 +2526,7 @@
             <a:pPr>
               <a:defRPr/>
             </a:pPr>
-            <a:r>
-              <a:rPr lang="en-US" altLang="en-US"/>
-              <a:t>Trustees Presentation</a:t>
-            </a:r>
+            <a:endParaRPr lang="en-US" altLang="en-US"/>
           </a:p>
         </p:txBody>
       </p:sp>
@@ -2490,17 +2561,10 @@
               <a:defRPr/>
             </a:pPr>
             <a:r>
-              <a:rPr lang="en-US" altLang="en-US"/>
-              <a:t>2/3/08  </a:t>
-            </a:r>
-            <a:fld id="{26A18AC9-35C2-C844-A9C8-711B884A04D2}" type="slidenum">
-              <a:rPr lang="en-US" altLang="en-US"/>
-              <a:pPr>
-                <a:defRPr/>
-              </a:pPr>
-              <a:t>‹#›</a:t>
-            </a:fld>
-            <a:endParaRPr lang="en-US" altLang="en-US" baseline="0"/>
+              <a:rPr lang="en-US" altLang="en-US" baseline="0"/>
+              <a:t>Simulation, Pricing and Validation of an Atlas Option</a:t>
+            </a:r>
+            <a:endParaRPr lang="en-US" altLang="en-US" baseline="0" dirty="0"/>
           </a:p>
         </p:txBody>
       </p:sp>
@@ -2698,10 +2762,7 @@
             <a:pPr>
               <a:defRPr/>
             </a:pPr>
-            <a:r>
-              <a:rPr lang="en-US" altLang="en-US"/>
-              <a:t>Trustees Presentation</a:t>
-            </a:r>
+            <a:endParaRPr lang="en-US" altLang="en-US"/>
           </a:p>
         </p:txBody>
       </p:sp>
@@ -2736,17 +2797,9 @@
               <a:defRPr/>
             </a:pPr>
             <a:r>
-              <a:rPr lang="en-US" altLang="en-US"/>
-              <a:t>2/3/08  </a:t>
-            </a:r>
-            <a:fld id="{A948A393-D4A7-B74D-8221-64887C7AE610}" type="slidenum">
-              <a:rPr lang="en-US" altLang="en-US"/>
-              <a:pPr>
-                <a:defRPr/>
-              </a:pPr>
-              <a:t>‹#›</a:t>
-            </a:fld>
-            <a:endParaRPr lang="en-US" altLang="en-US" baseline="0"/>
+              <a:rPr lang="en-US" altLang="en-US" baseline="0"/>
+              <a:t>Simulation, Pricing and Validation of an Atlas Option</a:t>
+            </a:r>
           </a:p>
         </p:txBody>
       </p:sp>
@@ -3079,10 +3132,7 @@
             <a:pPr>
               <a:defRPr/>
             </a:pPr>
-            <a:r>
-              <a:rPr lang="en-US" altLang="en-US"/>
-              <a:t>Trustees Presentation</a:t>
-            </a:r>
+            <a:endParaRPr lang="en-US" altLang="en-US"/>
           </a:p>
         </p:txBody>
       </p:sp>
@@ -3117,17 +3167,9 @@
               <a:defRPr/>
             </a:pPr>
             <a:r>
-              <a:rPr lang="en-US" altLang="en-US"/>
-              <a:t>2/3/08  </a:t>
-            </a:r>
-            <a:fld id="{3011EBDA-72F6-F047-8348-7DEC043011C2}" type="slidenum">
-              <a:rPr lang="en-US" altLang="en-US"/>
-              <a:pPr>
-                <a:defRPr/>
-              </a:pPr>
-              <a:t>‹#›</a:t>
-            </a:fld>
-            <a:endParaRPr lang="en-US" altLang="en-US" baseline="0"/>
+              <a:rPr lang="en-US" altLang="en-US" baseline="0"/>
+              <a:t>Simulation, Pricing and Validation of an Atlas Option</a:t>
+            </a:r>
           </a:p>
         </p:txBody>
       </p:sp>
@@ -3213,10 +3255,7 @@
             <a:pPr>
               <a:defRPr/>
             </a:pPr>
-            <a:r>
-              <a:rPr lang="en-US" altLang="en-US"/>
-              <a:t>Trustees Presentation</a:t>
-            </a:r>
+            <a:endParaRPr lang="en-US" altLang="en-US"/>
           </a:p>
         </p:txBody>
       </p:sp>
@@ -3251,17 +3290,9 @@
               <a:defRPr/>
             </a:pPr>
             <a:r>
-              <a:rPr lang="en-US" altLang="en-US"/>
-              <a:t>2/3/08  </a:t>
-            </a:r>
-            <a:fld id="{4C07DA4A-8BCA-1C43-9DD8-EC9BE5EBEA49}" type="slidenum">
-              <a:rPr lang="en-US" altLang="en-US"/>
-              <a:pPr>
-                <a:defRPr/>
-              </a:pPr>
-              <a:t>‹#›</a:t>
-            </a:fld>
-            <a:endParaRPr lang="en-US" altLang="en-US" baseline="0"/>
+              <a:rPr lang="en-US" altLang="en-US" baseline="0"/>
+              <a:t>Simulation, Pricing and Validation of an Atlas Option</a:t>
+            </a:r>
           </a:p>
         </p:txBody>
       </p:sp>
@@ -3325,10 +3356,7 @@
             <a:pPr>
               <a:defRPr/>
             </a:pPr>
-            <a:r>
-              <a:rPr lang="en-US" altLang="en-US"/>
-              <a:t>Trustees Presentation</a:t>
-            </a:r>
+            <a:endParaRPr lang="en-US" altLang="en-US"/>
           </a:p>
         </p:txBody>
       </p:sp>
@@ -3363,17 +3391,9 @@
               <a:defRPr/>
             </a:pPr>
             <a:r>
-              <a:rPr lang="en-US" altLang="en-US"/>
-              <a:t>2/3/08  </a:t>
-            </a:r>
-            <a:fld id="{41FE893A-2170-5C4E-B6AF-F26905CDD333}" type="slidenum">
-              <a:rPr lang="en-US" altLang="en-US"/>
-              <a:pPr>
-                <a:defRPr/>
-              </a:pPr>
-              <a:t>‹#›</a:t>
-            </a:fld>
-            <a:endParaRPr lang="en-US" altLang="en-US" baseline="0"/>
+              <a:rPr lang="en-US" altLang="en-US" baseline="0"/>
+              <a:t>Simulation, Pricing and Validation of an Atlas Option</a:t>
+            </a:r>
           </a:p>
         </p:txBody>
       </p:sp>
@@ -3617,10 +3637,7 @@
             <a:pPr>
               <a:defRPr/>
             </a:pPr>
-            <a:r>
-              <a:rPr lang="en-US" altLang="en-US"/>
-              <a:t>Trustees Presentation</a:t>
-            </a:r>
+            <a:endParaRPr lang="en-US" altLang="en-US"/>
           </a:p>
         </p:txBody>
       </p:sp>
@@ -3655,17 +3672,9 @@
               <a:defRPr/>
             </a:pPr>
             <a:r>
-              <a:rPr lang="en-US" altLang="en-US"/>
-              <a:t>2/3/08  </a:t>
-            </a:r>
-            <a:fld id="{9640A902-B6DB-234A-B3D1-9C0503B9102F}" type="slidenum">
-              <a:rPr lang="en-US" altLang="en-US"/>
-              <a:pPr>
-                <a:defRPr/>
-              </a:pPr>
-              <a:t>‹#›</a:t>
-            </a:fld>
-            <a:endParaRPr lang="en-US" altLang="en-US" baseline="0"/>
+              <a:rPr lang="en-US" altLang="en-US" baseline="0"/>
+              <a:t>Simulation, Pricing and Validation of an Atlas Option</a:t>
+            </a:r>
           </a:p>
         </p:txBody>
       </p:sp>
@@ -3887,10 +3896,7 @@
             <a:pPr>
               <a:defRPr/>
             </a:pPr>
-            <a:r>
-              <a:rPr lang="en-US" altLang="en-US"/>
-              <a:t>Trustees Presentation</a:t>
-            </a:r>
+            <a:endParaRPr lang="en-US" altLang="en-US"/>
           </a:p>
         </p:txBody>
       </p:sp>
@@ -3925,17 +3931,9 @@
               <a:defRPr/>
             </a:pPr>
             <a:r>
-              <a:rPr lang="en-US" altLang="en-US"/>
-              <a:t>2/3/08  </a:t>
-            </a:r>
-            <a:fld id="{51255004-F1AA-C34F-A5F0-C3EEDD9BFDCB}" type="slidenum">
-              <a:rPr lang="en-US" altLang="en-US"/>
-              <a:pPr>
-                <a:defRPr/>
-              </a:pPr>
-              <a:t>‹#›</a:t>
-            </a:fld>
-            <a:endParaRPr lang="en-US" altLang="en-US" baseline="0"/>
+              <a:rPr lang="en-US" altLang="en-US" baseline="0"/>
+              <a:t>Simulation, Pricing and Validation of an Atlas Option</a:t>
+            </a:r>
           </a:p>
         </p:txBody>
       </p:sp>
@@ -4316,10 +4314,7 @@
             <a:pPr>
               <a:defRPr/>
             </a:pPr>
-            <a:r>
-              <a:rPr lang="en-US" altLang="en-US"/>
-              <a:t>Trustees Presentation</a:t>
-            </a:r>
+            <a:endParaRPr lang="en-US" altLang="en-US"/>
           </a:p>
         </p:txBody>
       </p:sp>
@@ -4571,17 +4566,10 @@
               <a:defRPr/>
             </a:pPr>
             <a:r>
-              <a:rPr lang="en-US" altLang="en-US"/>
-              <a:t>2/3/08  </a:t>
-            </a:r>
-            <a:fld id="{659701BF-F498-1642-B0AC-60CC0906B7CC}" type="slidenum">
-              <a:rPr lang="en-US" altLang="en-US"/>
-              <a:pPr>
-                <a:defRPr/>
-              </a:pPr>
-              <a:t>‹#›</a:t>
-            </a:fld>
-            <a:endParaRPr lang="en-US" altLang="en-US" baseline="0"/>
+              <a:rPr lang="en-US" altLang="en-US" baseline="0"/>
+              <a:t>Simulation, Pricing and Validation of an Atlas Option</a:t>
+            </a:r>
+            <a:endParaRPr lang="en-US" altLang="en-US" baseline="0" dirty="0"/>
           </a:p>
         </p:txBody>
       </p:sp>
@@ -4664,7 +4652,7 @@
                 <a:latin typeface="Arial" charset="0"/>
                 <a:ea typeface="Osaka" charset="0"/>
               </a:rPr>
-              <a:t> School/college name here</a:t>
+              <a:t> School/Questrom School of Business</a:t>
             </a:r>
           </a:p>
         </p:txBody>
@@ -4684,7 +4672,7 @@
     <p:sldLayoutId id="2147483717" r:id="rId9"/>
     <p:sldLayoutId id="2147483719" r:id="rId10"/>
   </p:sldLayoutIdLst>
-  <p:hf sldNum="0" hdr="0"/>
+  <p:hf sldNum="0" hdr="0" ftr="0" dt="0"/>
   <p:txStyles>
     <p:titleStyle>
       <a:lvl1pPr algn="l" rtl="0" eaLnBrk="0" fontAlgn="base" hangingPunct="0">
@@ -5144,8 +5132,8 @@
               <a:defRPr/>
             </a:pPr>
             <a:r>
-              <a:rPr lang="en-US" altLang="en-US"/>
-              <a:t>Presentation Title</a:t>
+              <a:rPr lang="en-US" altLang="en-US" dirty="0"/>
+              <a:t>Simulation, Pricing and Validation of an Atlas Option</a:t>
             </a:r>
           </a:p>
         </p:txBody>
@@ -5166,7 +5154,12 @@
             <p:ph type="subTitle" idx="1"/>
           </p:nvPr>
         </p:nvSpPr>
-        <p:spPr/>
+        <p:spPr>
+          <a:xfrm>
+            <a:off x="685800" y="3657600"/>
+            <a:ext cx="7772400" cy="1752600"/>
+          </a:xfrm>
+        </p:spPr>
         <p:txBody>
           <a:bodyPr/>
           <a:lstStyle/>
@@ -5175,8 +5168,51 @@
               <a:defRPr/>
             </a:pPr>
             <a:r>
-              <a:rPr lang="en-US" altLang="en-US"/>
-              <a:t>Subtitle or Date</a:t>
+              <a:rPr lang="en-US" altLang="en-US" dirty="0">
+                <a:solidFill>
+                  <a:schemeClr val="tx1"/>
+                </a:solidFill>
+              </a:rPr>
+              <a:t>Completed by :</a:t>
+            </a:r>
+          </a:p>
+          <a:p>
+            <a:pPr eaLnBrk="1" hangingPunct="1">
+              <a:defRPr/>
+            </a:pPr>
+            <a:r>
+              <a:rPr lang="en-US" altLang="en-US" dirty="0">
+                <a:solidFill>
+                  <a:schemeClr val="tx1"/>
+                </a:solidFill>
+              </a:rPr>
+              <a:t>Robert Cook</a:t>
+            </a:r>
+          </a:p>
+          <a:p>
+            <a:pPr eaLnBrk="1" hangingPunct="1">
+              <a:defRPr/>
+            </a:pPr>
+            <a:r>
+              <a:rPr lang="en-US" altLang="en-US" dirty="0">
+                <a:solidFill>
+                  <a:schemeClr val="tx1"/>
+                </a:solidFill>
+              </a:rPr>
+              <a:t>Georgios Kepertis</a:t>
+            </a:r>
+          </a:p>
+          <a:p>
+            <a:pPr eaLnBrk="1" hangingPunct="1">
+              <a:defRPr/>
+            </a:pPr>
+            <a:r>
+              <a:rPr lang="en-US" altLang="en-US" dirty="0">
+                <a:solidFill>
+                  <a:schemeClr val="tx1"/>
+                </a:solidFill>
+              </a:rPr>
+              <a:t>Bhavin Shah</a:t>
             </a:r>
           </a:p>
         </p:txBody>
@@ -5208,76 +5244,6 @@
       </p:grpSpPr>
       <p:sp>
         <p:nvSpPr>
-          <p:cNvPr id="5" name="Footer Placeholder 3">
-            <a:extLst>
-              <a:ext uri="{FF2B5EF4-FFF2-40B4-BE49-F238E27FC236}">
-                <a16:creationId xmlns:a16="http://schemas.microsoft.com/office/drawing/2014/main" id="{28D58CE5-4FD6-0F4B-AAE8-E8BA782C2263}"/>
-              </a:ext>
-            </a:extLst>
-          </p:cNvPr>
-          <p:cNvSpPr>
-            <a:spLocks noGrp="1"/>
-          </p:cNvSpPr>
-          <p:nvPr>
-            <p:ph type="ftr" sz="quarter" idx="10"/>
-          </p:nvPr>
-        </p:nvSpPr>
-        <p:spPr/>
-        <p:txBody>
-          <a:bodyPr/>
-          <a:lstStyle/>
-          <a:p>
-            <a:pPr>
-              <a:defRPr/>
-            </a:pPr>
-            <a:r>
-              <a:rPr lang="en-US" altLang="en-US"/>
-              <a:t>Presentation Title</a:t>
-            </a:r>
-          </a:p>
-        </p:txBody>
-      </p:sp>
-      <p:sp>
-        <p:nvSpPr>
-          <p:cNvPr id="6" name="Date Placeholder 4">
-            <a:extLst>
-              <a:ext uri="{FF2B5EF4-FFF2-40B4-BE49-F238E27FC236}">
-                <a16:creationId xmlns:a16="http://schemas.microsoft.com/office/drawing/2014/main" id="{1D05D912-DD76-9740-BD4A-8BDD6BFF8E1F}"/>
-              </a:ext>
-            </a:extLst>
-          </p:cNvPr>
-          <p:cNvSpPr>
-            <a:spLocks noGrp="1"/>
-          </p:cNvSpPr>
-          <p:nvPr>
-            <p:ph type="dt" sz="quarter" idx="11"/>
-          </p:nvPr>
-        </p:nvSpPr>
-        <p:spPr/>
-        <p:txBody>
-          <a:bodyPr/>
-          <a:lstStyle/>
-          <a:p>
-            <a:pPr>
-              <a:defRPr/>
-            </a:pPr>
-            <a:r>
-              <a:rPr lang="en-US" altLang="en-US"/>
-              <a:t>2/3/08  </a:t>
-            </a:r>
-            <a:fld id="{82DD7A96-85F9-454B-A1B3-FA2F0A06CD82}" type="slidenum">
-              <a:rPr lang="en-US" altLang="en-US"/>
-              <a:pPr>
-                <a:defRPr/>
-              </a:pPr>
-              <a:t>2</a:t>
-            </a:fld>
-            <a:endParaRPr lang="en-US" altLang="en-US" baseline="0"/>
-          </a:p>
-        </p:txBody>
-      </p:sp>
-      <p:sp>
-        <p:nvSpPr>
           <p:cNvPr id="5122" name="Rectangle 2">
             <a:extLst>
               <a:ext uri="{FF2B5EF4-FFF2-40B4-BE49-F238E27FC236}">
@@ -5301,13 +5267,10 @@
               <a:defRPr/>
             </a:pPr>
             <a:r>
-              <a:rPr lang="en-US" altLang="en-US" b="1"/>
-              <a:t>Editing</a:t>
-            </a:r>
-            <a:r>
-              <a:rPr lang="en-US" altLang="en-US"/>
-              <a:t> this Template</a:t>
-            </a:r>
+              <a:rPr lang="en-US" altLang="en-US" b="1" dirty="0"/>
+              <a:t>What is an Atlas Option?</a:t>
+            </a:r>
+            <a:endParaRPr lang="en-US" altLang="en-US" dirty="0"/>
           </a:p>
         </p:txBody>
       </p:sp>
@@ -5327,7 +5290,12 @@
             <p:ph type="body" idx="1"/>
           </p:nvPr>
         </p:nvSpPr>
-        <p:spPr/>
+        <p:spPr>
+          <a:xfrm>
+            <a:off x="609600" y="1600200"/>
+            <a:ext cx="7924800" cy="4267200"/>
+          </a:xfrm>
+        </p:spPr>
         <p:txBody>
           <a:bodyPr/>
           <a:lstStyle/>
@@ -5341,43 +5309,22 @@
               <a:defRPr/>
             </a:pPr>
             <a:r>
-              <a:rPr lang="en-US" sz="1800" dirty="0"/>
-              <a:t>The info at the top of the slide can be changed. Simply go to the </a:t>
-            </a:r>
-            <a:r>
-              <a:rPr lang="en-US" sz="1800" b="1" dirty="0"/>
-              <a:t>View</a:t>
-            </a:r>
-            <a:r>
-              <a:rPr lang="en-US" sz="1800" dirty="0"/>
-              <a:t> drop-down menu, select </a:t>
-            </a:r>
-            <a:r>
-              <a:rPr lang="en-US" sz="1800" b="1" dirty="0"/>
-              <a:t>Header and Footer</a:t>
-            </a:r>
-            <a:r>
-              <a:rPr lang="en-US" sz="1800" dirty="0"/>
-              <a:t>, and make your edits in the box that appears.</a:t>
-            </a:r>
-          </a:p>
-          <a:p>
-            <a:pPr lvl="1" eaLnBrk="1" hangingPunct="1">
+              <a:rPr lang="en-US" sz="2000" dirty="0"/>
+              <a:t>The Atlas option is a call on the mean of a basket of stocks, a basket that has some of the best and worst performers removed.</a:t>
+            </a:r>
+          </a:p>
+          <a:p>
+            <a:pPr marL="0" indent="0" eaLnBrk="1" hangingPunct="1">
               <a:buClr>
                 <a:srgbClr val="CC0000"/>
               </a:buClr>
-              <a:buFont typeface="Wingdings" charset="2"/>
-              <a:buChar char="§"/>
+              <a:buNone/>
               <a:defRPr/>
             </a:pPr>
             <a:r>
-              <a:rPr lang="en-US" dirty="0"/>
-              <a:t>The Header and Footer menu can also be used to enable/disable automatic slide numbering. </a:t>
-            </a:r>
-            <a:br>
-              <a:rPr lang="en-US" dirty="0"/>
-            </a:br>
-            <a:endParaRPr lang="en-US" dirty="0"/>
+              <a:rPr lang="en-US" sz="2000" dirty="0"/>
+              <a:t> </a:t>
+            </a:r>
           </a:p>
           <a:p>
             <a:pPr eaLnBrk="1" hangingPunct="1">
@@ -5389,36 +5336,12 @@
               <a:defRPr/>
             </a:pPr>
             <a:r>
-              <a:rPr lang="en-US" sz="1800" dirty="0"/>
-              <a:t>To change the school name in the footer, go to the </a:t>
-            </a:r>
-            <a:r>
-              <a:rPr lang="en-US" sz="1800" b="1" dirty="0"/>
-              <a:t>View</a:t>
-            </a:r>
-            <a:r>
-              <a:rPr lang="en-US" sz="1800" dirty="0"/>
-              <a:t> drop-down menu and select </a:t>
-            </a:r>
-            <a:r>
-              <a:rPr lang="en-US" sz="1800" b="1" dirty="0"/>
-              <a:t>Master</a:t>
-            </a:r>
-            <a:r>
-              <a:rPr lang="en-US" sz="1800" dirty="0"/>
-              <a:t>, then </a:t>
-            </a:r>
-            <a:r>
-              <a:rPr lang="en-US" sz="1800" b="1" dirty="0"/>
-              <a:t>Slide Master</a:t>
-            </a:r>
-            <a:r>
-              <a:rPr lang="en-US" sz="1800" dirty="0"/>
-              <a:t>. Click on “School/college name here” and update accordingly. </a:t>
-            </a:r>
-          </a:p>
-          <a:p>
-            <a:pPr lvl="1" eaLnBrk="1" hangingPunct="1">
+              <a:rPr lang="en-US" sz="2000" dirty="0"/>
+              <a:t>The number of stocks at the top and bottom of the basket to be removed can be varied.</a:t>
+            </a:r>
+          </a:p>
+          <a:p>
+            <a:pPr eaLnBrk="1" hangingPunct="1">
               <a:buClr>
                 <a:srgbClr val="CC0000"/>
               </a:buClr>
@@ -5426,13 +5349,10 @@
               <a:buChar char="§"/>
               <a:defRPr/>
             </a:pPr>
-            <a:r>
-              <a:rPr lang="en-US" dirty="0"/>
-              <a:t>Please note: To appear on all slides of your presentation, this change must be made on both of the first two slides of the master.</a:t>
-            </a:r>
-          </a:p>
-          <a:p>
-            <a:pPr lvl="1" eaLnBrk="1" hangingPunct="1">
+            <a:endParaRPr lang="en-US" sz="2000" dirty="0"/>
+          </a:p>
+          <a:p>
+            <a:pPr eaLnBrk="1" hangingPunct="1">
               <a:buClr>
                 <a:srgbClr val="CC0000"/>
               </a:buClr>
@@ -5440,7 +5360,87 @@
               <a:buChar char="§"/>
               <a:defRPr/>
             </a:pPr>
-            <a:endParaRPr lang="en-US" altLang="en-US" dirty="0"/>
+            <a:r>
+              <a:rPr lang="en-US" sz="2000" dirty="0"/>
+              <a:t>It is one of many exotic options that come under Mountain Range options</a:t>
+            </a:r>
+          </a:p>
+          <a:p>
+            <a:pPr eaLnBrk="1" hangingPunct="1">
+              <a:buClr>
+                <a:srgbClr val="CC0000"/>
+              </a:buClr>
+              <a:buFont typeface="Wingdings" charset="2"/>
+              <a:buChar char="§"/>
+              <a:defRPr/>
+            </a:pPr>
+            <a:endParaRPr lang="en-US" sz="2000" dirty="0"/>
+          </a:p>
+          <a:p>
+            <a:pPr eaLnBrk="1" hangingPunct="1">
+              <a:buClr>
+                <a:srgbClr val="CC0000"/>
+              </a:buClr>
+              <a:buFont typeface="Wingdings" charset="2"/>
+              <a:buChar char="§"/>
+              <a:defRPr/>
+            </a:pPr>
+            <a:r>
+              <a:rPr lang="en-US" sz="2000" dirty="0"/>
+              <a:t>An important feature of this option is that the payoff is expressed as a percent of a reference, usually taken as an index.</a:t>
+            </a:r>
+          </a:p>
+          <a:p>
+            <a:pPr eaLnBrk="1" hangingPunct="1">
+              <a:buClr>
+                <a:srgbClr val="CC0000"/>
+              </a:buClr>
+              <a:buFont typeface="Wingdings" charset="2"/>
+              <a:buChar char="§"/>
+              <a:defRPr/>
+            </a:pPr>
+            <a:endParaRPr lang="en-US" sz="2000" dirty="0"/>
+          </a:p>
+          <a:p>
+            <a:pPr marL="0" indent="0" eaLnBrk="1" hangingPunct="1">
+              <a:buClr>
+                <a:srgbClr val="CC0000"/>
+              </a:buClr>
+              <a:buNone/>
+              <a:defRPr/>
+            </a:pPr>
+            <a:endParaRPr lang="en-US" sz="2000" dirty="0"/>
+          </a:p>
+          <a:p>
+            <a:pPr eaLnBrk="1" hangingPunct="1">
+              <a:buClr>
+                <a:srgbClr val="CC0000"/>
+              </a:buClr>
+              <a:buFont typeface="Wingdings" charset="2"/>
+              <a:buChar char="§"/>
+              <a:defRPr/>
+            </a:pPr>
+            <a:endParaRPr lang="en-US" sz="2000" dirty="0"/>
+          </a:p>
+          <a:p>
+            <a:pPr eaLnBrk="1" hangingPunct="1">
+              <a:buClr>
+                <a:srgbClr val="CC0000"/>
+              </a:buClr>
+              <a:buFont typeface="Wingdings" charset="2"/>
+              <a:buChar char="§"/>
+              <a:defRPr/>
+            </a:pPr>
+            <a:endParaRPr lang="en-US" sz="2000" dirty="0"/>
+          </a:p>
+          <a:p>
+            <a:pPr eaLnBrk="1" hangingPunct="1">
+              <a:buClr>
+                <a:srgbClr val="CC0000"/>
+              </a:buClr>
+              <a:defRPr/>
+            </a:pPr>
+            <a:endParaRPr lang="en-US" sz="1800" dirty="0"/>
           </a:p>
         </p:txBody>
       </p:sp>
@@ -5519,6 +5519,669 @@
         </p:txBody>
       </p:sp>
     </p:spTree>
+  </p:cSld>
+  <p:clrMapOvr>
+    <a:masterClrMapping/>
+  </p:clrMapOvr>
+</p:sld>
+</file>
+
+<file path=ppt/slides/slide3.xml><?xml version="1.0" encoding="utf-8"?>
+<p:sld xmlns:a="http://schemas.openxmlformats.org/drawingml/2006/main" xmlns:r="http://schemas.openxmlformats.org/officeDocument/2006/relationships" xmlns:p="http://schemas.openxmlformats.org/presentationml/2006/main">
+  <p:cSld>
+    <p:spTree>
+      <p:nvGrpSpPr>
+        <p:cNvPr id="1" name=""/>
+        <p:cNvGrpSpPr/>
+        <p:nvPr/>
+      </p:nvGrpSpPr>
+      <p:grpSpPr>
+        <a:xfrm>
+          <a:off x="0" y="0"/>
+          <a:ext cx="0" cy="0"/>
+          <a:chOff x="0" y="0"/>
+          <a:chExt cx="0" cy="0"/>
+        </a:xfrm>
+      </p:grpSpPr>
+      <p:sp>
+        <p:nvSpPr>
+          <p:cNvPr id="3" name="Text Placeholder 2">
+            <a:extLst>
+              <a:ext uri="{FF2B5EF4-FFF2-40B4-BE49-F238E27FC236}">
+                <a16:creationId xmlns:a16="http://schemas.microsoft.com/office/drawing/2014/main" id="{A5414941-7BB9-FC4E-A55A-10B487F4E895}"/>
+              </a:ext>
+            </a:extLst>
+          </p:cNvPr>
+          <p:cNvSpPr>
+            <a:spLocks noGrp="1"/>
+          </p:cNvSpPr>
+          <p:nvPr>
+            <p:ph type="body" idx="1"/>
+          </p:nvPr>
+        </p:nvSpPr>
+        <p:spPr>
+          <a:xfrm>
+            <a:off x="630237" y="668337"/>
+            <a:ext cx="3868737" cy="823912"/>
+          </a:xfrm>
+        </p:spPr>
+        <p:txBody>
+          <a:bodyPr/>
+          <a:lstStyle/>
+          <a:p>
+            <a:r>
+              <a:rPr lang="en-US" dirty="0">
+                <a:latin typeface="+mj-lt"/>
+              </a:rPr>
+              <a:t>Pros</a:t>
+            </a:r>
+          </a:p>
+        </p:txBody>
+      </p:sp>
+      <p:sp>
+        <p:nvSpPr>
+          <p:cNvPr id="4" name="Content Placeholder 3">
+            <a:extLst>
+              <a:ext uri="{FF2B5EF4-FFF2-40B4-BE49-F238E27FC236}">
+                <a16:creationId xmlns:a16="http://schemas.microsoft.com/office/drawing/2014/main" id="{E9EA79F7-37B8-9046-B854-C8C93950EFA4}"/>
+              </a:ext>
+            </a:extLst>
+          </p:cNvPr>
+          <p:cNvSpPr>
+            <a:spLocks noGrp="1"/>
+          </p:cNvSpPr>
+          <p:nvPr>
+            <p:ph sz="half" idx="2"/>
+          </p:nvPr>
+        </p:nvSpPr>
+        <p:spPr>
+          <a:xfrm>
+            <a:off x="630238" y="1752600"/>
+            <a:ext cx="3868737" cy="4437063"/>
+          </a:xfrm>
+        </p:spPr>
+        <p:txBody>
+          <a:bodyPr/>
+          <a:lstStyle/>
+          <a:p>
+            <a:r>
+              <a:rPr lang="en-US" sz="2000" dirty="0"/>
+              <a:t>Less transaction costs : One transaction instead of having to take individual trades on every position in the basket</a:t>
+            </a:r>
+          </a:p>
+          <a:p>
+            <a:r>
+              <a:rPr lang="en-US" sz="2000" dirty="0"/>
+              <a:t>Eliminate the risk associated with entry and exit timing</a:t>
+            </a:r>
+          </a:p>
+          <a:p>
+            <a:r>
+              <a:rPr lang="en-US" sz="2000" dirty="0"/>
+              <a:t>Offer flexibility and customization, hence can be tweaked as per risk-preference</a:t>
+            </a:r>
+          </a:p>
+        </p:txBody>
+      </p:sp>
+      <p:sp>
+        <p:nvSpPr>
+          <p:cNvPr id="5" name="Text Placeholder 4">
+            <a:extLst>
+              <a:ext uri="{FF2B5EF4-FFF2-40B4-BE49-F238E27FC236}">
+                <a16:creationId xmlns:a16="http://schemas.microsoft.com/office/drawing/2014/main" id="{B50D74CA-1954-554B-957A-EA7CCC3797A7}"/>
+              </a:ext>
+            </a:extLst>
+          </p:cNvPr>
+          <p:cNvSpPr>
+            <a:spLocks noGrp="1"/>
+          </p:cNvSpPr>
+          <p:nvPr>
+            <p:ph type="body" sz="quarter" idx="3"/>
+          </p:nvPr>
+        </p:nvSpPr>
+        <p:spPr>
+          <a:xfrm>
+            <a:off x="4629150" y="670483"/>
+            <a:ext cx="3887788" cy="823912"/>
+          </a:xfrm>
+        </p:spPr>
+        <p:txBody>
+          <a:bodyPr/>
+          <a:lstStyle/>
+          <a:p>
+            <a:r>
+              <a:rPr lang="en-US" dirty="0">
+                <a:latin typeface="+mj-lt"/>
+              </a:rPr>
+              <a:t>Cons</a:t>
+            </a:r>
+          </a:p>
+        </p:txBody>
+      </p:sp>
+      <p:sp>
+        <p:nvSpPr>
+          <p:cNvPr id="6" name="Content Placeholder 5">
+            <a:extLst>
+              <a:ext uri="{FF2B5EF4-FFF2-40B4-BE49-F238E27FC236}">
+                <a16:creationId xmlns:a16="http://schemas.microsoft.com/office/drawing/2014/main" id="{45F23F7B-144C-A042-B1E4-598E92E043A3}"/>
+              </a:ext>
+            </a:extLst>
+          </p:cNvPr>
+          <p:cNvSpPr>
+            <a:spLocks noGrp="1"/>
+          </p:cNvSpPr>
+          <p:nvPr>
+            <p:ph sz="quarter" idx="4"/>
+          </p:nvPr>
+        </p:nvSpPr>
+        <p:spPr>
+          <a:xfrm>
+            <a:off x="4629150" y="1752600"/>
+            <a:ext cx="3887788" cy="4437063"/>
+          </a:xfrm>
+        </p:spPr>
+        <p:txBody>
+          <a:bodyPr/>
+          <a:lstStyle/>
+          <a:p>
+            <a:r>
+              <a:rPr lang="en-US" sz="2000" dirty="0"/>
+              <a:t>Less liquidity available as compared to vanilla options</a:t>
+            </a:r>
+          </a:p>
+          <a:p>
+            <a:r>
+              <a:rPr lang="en-US" sz="2000" dirty="0"/>
+              <a:t>Price of the option might not correlate or trade in the same manner as the individual components would to price fluctuations or the time remaining until expiration</a:t>
+            </a:r>
+          </a:p>
+          <a:p>
+            <a:r>
+              <a:rPr lang="en-US" sz="2000" dirty="0"/>
+              <a:t>Higher premium than vanilla options</a:t>
+            </a:r>
+          </a:p>
+        </p:txBody>
+      </p:sp>
+    </p:spTree>
+    <p:extLst>
+      <p:ext uri="{BB962C8B-B14F-4D97-AF65-F5344CB8AC3E}">
+        <p14:creationId xmlns:p14="http://schemas.microsoft.com/office/powerpoint/2010/main" val="1314067769"/>
+      </p:ext>
+    </p:extLst>
+  </p:cSld>
+  <p:clrMapOvr>
+    <a:masterClrMapping/>
+  </p:clrMapOvr>
+</p:sld>
+</file>
+
+<file path=ppt/slides/slide4.xml><?xml version="1.0" encoding="utf-8"?>
+<p:sld xmlns:a="http://schemas.openxmlformats.org/drawingml/2006/main" xmlns:r="http://schemas.openxmlformats.org/officeDocument/2006/relationships" xmlns:p="http://schemas.openxmlformats.org/presentationml/2006/main">
+  <p:cSld>
+    <p:spTree>
+      <p:nvGrpSpPr>
+        <p:cNvPr id="1" name=""/>
+        <p:cNvGrpSpPr/>
+        <p:nvPr/>
+      </p:nvGrpSpPr>
+      <p:grpSpPr>
+        <a:xfrm>
+          <a:off x="0" y="0"/>
+          <a:ext cx="0" cy="0"/>
+          <a:chOff x="0" y="0"/>
+          <a:chExt cx="0" cy="0"/>
+        </a:xfrm>
+      </p:grpSpPr>
+      <p:sp>
+        <p:nvSpPr>
+          <p:cNvPr id="2" name="Title 1">
+            <a:extLst>
+              <a:ext uri="{FF2B5EF4-FFF2-40B4-BE49-F238E27FC236}">
+                <a16:creationId xmlns:a16="http://schemas.microsoft.com/office/drawing/2014/main" id="{F3F16448-77FC-1F45-9765-9561C620B790}"/>
+              </a:ext>
+            </a:extLst>
+          </p:cNvPr>
+          <p:cNvSpPr>
+            <a:spLocks noGrp="1"/>
+          </p:cNvSpPr>
+          <p:nvPr>
+            <p:ph type="title"/>
+          </p:nvPr>
+        </p:nvSpPr>
+        <p:spPr/>
+        <p:txBody>
+          <a:bodyPr/>
+          <a:lstStyle/>
+          <a:p>
+            <a:r>
+              <a:rPr lang="en-US" b="1" dirty="0"/>
+              <a:t>Assumptions</a:t>
+            </a:r>
+          </a:p>
+        </p:txBody>
+      </p:sp>
+      <p:sp>
+        <p:nvSpPr>
+          <p:cNvPr id="3" name="Content Placeholder 2">
+            <a:extLst>
+              <a:ext uri="{FF2B5EF4-FFF2-40B4-BE49-F238E27FC236}">
+                <a16:creationId xmlns:a16="http://schemas.microsoft.com/office/drawing/2014/main" id="{F515C120-0E7F-0843-9BAD-49FB8A2EC915}"/>
+              </a:ext>
+            </a:extLst>
+          </p:cNvPr>
+          <p:cNvSpPr>
+            <a:spLocks noGrp="1"/>
+          </p:cNvSpPr>
+          <p:nvPr>
+            <p:ph idx="1"/>
+          </p:nvPr>
+        </p:nvSpPr>
+        <p:spPr>
+          <a:xfrm>
+            <a:off x="609600" y="1676400"/>
+            <a:ext cx="7924800" cy="3886200"/>
+          </a:xfrm>
+        </p:spPr>
+        <p:txBody>
+          <a:bodyPr/>
+          <a:lstStyle/>
+          <a:p>
+            <a:r>
+              <a:rPr lang="en-US" sz="2000" dirty="0"/>
+              <a:t>The risk-free rate is constant</a:t>
+            </a:r>
+          </a:p>
+          <a:p>
+            <a:endParaRPr lang="en-US" sz="2000" dirty="0"/>
+          </a:p>
+          <a:p>
+            <a:r>
+              <a:rPr lang="en-US" sz="2000" dirty="0"/>
+              <a:t>Volatility used in the Black-Scholes model is annualized realized volatility</a:t>
+            </a:r>
+          </a:p>
+          <a:p>
+            <a:endParaRPr lang="en-US" sz="2000" dirty="0"/>
+          </a:p>
+          <a:p>
+            <a:r>
+              <a:rPr lang="en-US" sz="2000" dirty="0"/>
+              <a:t>There are no transaction costs</a:t>
+            </a:r>
+          </a:p>
+          <a:p>
+            <a:endParaRPr lang="en-US" sz="2000" dirty="0"/>
+          </a:p>
+          <a:p>
+            <a:r>
+              <a:rPr lang="en-US" sz="2000" dirty="0"/>
+              <a:t>Returns are normally distributed</a:t>
+            </a:r>
+          </a:p>
+          <a:p>
+            <a:endParaRPr lang="en-US" sz="2000" dirty="0"/>
+          </a:p>
+          <a:p>
+            <a:r>
+              <a:rPr lang="en-US" sz="2000" dirty="0"/>
+              <a:t>Covariance matrix is created so that it is full-rank by construction</a:t>
+            </a:r>
+          </a:p>
+          <a:p>
+            <a:endParaRPr lang="en-US" sz="2000" dirty="0"/>
+          </a:p>
+          <a:p>
+            <a:endParaRPr lang="en-US" sz="2000" dirty="0"/>
+          </a:p>
+          <a:p>
+            <a:endParaRPr lang="en-US" dirty="0"/>
+          </a:p>
+        </p:txBody>
+      </p:sp>
+    </p:spTree>
+    <p:extLst>
+      <p:ext uri="{BB962C8B-B14F-4D97-AF65-F5344CB8AC3E}">
+        <p14:creationId xmlns:p14="http://schemas.microsoft.com/office/powerpoint/2010/main" val="331970442"/>
+      </p:ext>
+    </p:extLst>
+  </p:cSld>
+  <p:clrMapOvr>
+    <a:masterClrMapping/>
+  </p:clrMapOvr>
+</p:sld>
+</file>
+
+<file path=ppt/slides/slide5.xml><?xml version="1.0" encoding="utf-8"?>
+<p:sld xmlns:a="http://schemas.openxmlformats.org/drawingml/2006/main" xmlns:r="http://schemas.openxmlformats.org/officeDocument/2006/relationships" xmlns:p="http://schemas.openxmlformats.org/presentationml/2006/main">
+  <p:cSld>
+    <p:spTree>
+      <p:nvGrpSpPr>
+        <p:cNvPr id="1" name=""/>
+        <p:cNvGrpSpPr/>
+        <p:nvPr/>
+      </p:nvGrpSpPr>
+      <p:grpSpPr>
+        <a:xfrm>
+          <a:off x="0" y="0"/>
+          <a:ext cx="0" cy="0"/>
+          <a:chOff x="0" y="0"/>
+          <a:chExt cx="0" cy="0"/>
+        </a:xfrm>
+      </p:grpSpPr>
+      <p:sp>
+        <p:nvSpPr>
+          <p:cNvPr id="2" name="Title 1">
+            <a:extLst>
+              <a:ext uri="{FF2B5EF4-FFF2-40B4-BE49-F238E27FC236}">
+                <a16:creationId xmlns:a16="http://schemas.microsoft.com/office/drawing/2014/main" id="{FFD819D0-9AB9-2F45-A0D5-254E63C363F7}"/>
+              </a:ext>
+            </a:extLst>
+          </p:cNvPr>
+          <p:cNvSpPr>
+            <a:spLocks noGrp="1"/>
+          </p:cNvSpPr>
+          <p:nvPr>
+            <p:ph type="title"/>
+          </p:nvPr>
+        </p:nvSpPr>
+        <p:spPr/>
+        <p:txBody>
+          <a:bodyPr/>
+          <a:lstStyle/>
+          <a:p>
+            <a:r>
+              <a:rPr lang="en-US" b="1" dirty="0"/>
+              <a:t>Methodology</a:t>
+            </a:r>
+          </a:p>
+        </p:txBody>
+      </p:sp>
+      <p:sp>
+        <p:nvSpPr>
+          <p:cNvPr id="3" name="Content Placeholder 2">
+            <a:extLst>
+              <a:ext uri="{FF2B5EF4-FFF2-40B4-BE49-F238E27FC236}">
+                <a16:creationId xmlns:a16="http://schemas.microsoft.com/office/drawing/2014/main" id="{4BDC9D46-3DF2-E74B-AFF3-3AD2B7FAB337}"/>
+              </a:ext>
+            </a:extLst>
+          </p:cNvPr>
+          <p:cNvSpPr>
+            <a:spLocks noGrp="1"/>
+          </p:cNvSpPr>
+          <p:nvPr>
+            <p:ph idx="1"/>
+          </p:nvPr>
+        </p:nvSpPr>
+        <p:spPr/>
+        <p:txBody>
+          <a:bodyPr/>
+          <a:lstStyle/>
+          <a:p>
+            <a:r>
+              <a:rPr lang="en-US" sz="2000" dirty="0"/>
+              <a:t>Gather price data for the basket of stocks</a:t>
+            </a:r>
+          </a:p>
+          <a:p>
+            <a:r>
+              <a:rPr lang="en-US" sz="2000" dirty="0"/>
+              <a:t>Compute the returns, correlation matrix, covariance matrix  </a:t>
+            </a:r>
+          </a:p>
+          <a:p>
+            <a:r>
+              <a:rPr lang="en-US" sz="2000" dirty="0"/>
+              <a:t>Simulate prices for the basket of stocks </a:t>
+            </a:r>
+          </a:p>
+          <a:p>
+            <a:r>
+              <a:rPr lang="en-US" sz="2000" dirty="0"/>
+              <a:t>Using these simulated paths, we price the Atlas option based on how many best-performing and worst-performing stocks we want to remove</a:t>
+            </a:r>
+          </a:p>
+          <a:p>
+            <a:r>
+              <a:rPr lang="en-US" sz="2000" dirty="0"/>
+              <a:t>Obtain plots that help explain the behavior of the price of the option under various scenarios</a:t>
+            </a:r>
+          </a:p>
+        </p:txBody>
+      </p:sp>
+    </p:spTree>
+    <p:extLst>
+      <p:ext uri="{BB962C8B-B14F-4D97-AF65-F5344CB8AC3E}">
+        <p14:creationId xmlns:p14="http://schemas.microsoft.com/office/powerpoint/2010/main" val="484252490"/>
+      </p:ext>
+    </p:extLst>
+  </p:cSld>
+  <p:clrMapOvr>
+    <a:masterClrMapping/>
+  </p:clrMapOvr>
+</p:sld>
+</file>
+
+<file path=ppt/slides/slide6.xml><?xml version="1.0" encoding="utf-8"?>
+<p:sld xmlns:a="http://schemas.openxmlformats.org/drawingml/2006/main" xmlns:r="http://schemas.openxmlformats.org/officeDocument/2006/relationships" xmlns:p="http://schemas.openxmlformats.org/presentationml/2006/main">
+  <p:cSld>
+    <p:bg>
+      <p:bgPr>
+        <a:solidFill>
+          <a:schemeClr val="bg1"/>
+        </a:solidFill>
+        <a:effectLst/>
+      </p:bgPr>
+    </p:bg>
+    <p:spTree>
+      <p:nvGrpSpPr>
+        <p:cNvPr id="1" name=""/>
+        <p:cNvGrpSpPr/>
+        <p:nvPr/>
+      </p:nvGrpSpPr>
+      <p:grpSpPr>
+        <a:xfrm>
+          <a:off x="0" y="0"/>
+          <a:ext cx="0" cy="0"/>
+          <a:chOff x="0" y="0"/>
+          <a:chExt cx="0" cy="0"/>
+        </a:xfrm>
+      </p:grpSpPr>
+      <p:sp>
+        <p:nvSpPr>
+          <p:cNvPr id="2" name="Title 1">
+            <a:extLst>
+              <a:ext uri="{FF2B5EF4-FFF2-40B4-BE49-F238E27FC236}">
+                <a16:creationId xmlns:a16="http://schemas.microsoft.com/office/drawing/2014/main" id="{FD2B60FA-1C83-E04A-9B73-11E4819718A7}"/>
+              </a:ext>
+            </a:extLst>
+          </p:cNvPr>
+          <p:cNvSpPr>
+            <a:spLocks noGrp="1"/>
+          </p:cNvSpPr>
+          <p:nvPr>
+            <p:ph type="title"/>
+          </p:nvPr>
+        </p:nvSpPr>
+        <p:spPr>
+          <a:xfrm>
+            <a:off x="632079" y="554088"/>
+            <a:ext cx="7879842" cy="736369"/>
+          </a:xfrm>
+        </p:spPr>
+        <p:txBody>
+          <a:bodyPr vert="horz" lIns="91440" tIns="45720" rIns="91440" bIns="45720" rtlCol="0" anchor="b">
+            <a:normAutofit/>
+          </a:bodyPr>
+          <a:lstStyle/>
+          <a:p>
+            <a:pPr eaLnBrk="1" hangingPunct="1">
+              <a:lnSpc>
+                <a:spcPct val="90000"/>
+              </a:lnSpc>
+            </a:pPr>
+            <a:r>
+              <a:rPr lang="en-US" b="1" dirty="0"/>
+              <a:t>Examples</a:t>
+            </a:r>
+          </a:p>
+        </p:txBody>
+      </p:sp>
+      <p:pic>
+        <p:nvPicPr>
+          <p:cNvPr id="5" name="Content Placeholder 4" descr="A screenshot of a cell phone&#10;&#10;Description automatically generated">
+            <a:extLst>
+              <a:ext uri="{FF2B5EF4-FFF2-40B4-BE49-F238E27FC236}">
+                <a16:creationId xmlns:a16="http://schemas.microsoft.com/office/drawing/2014/main" id="{51E81FAF-7CED-1546-B37D-87EE00F37DD4}"/>
+              </a:ext>
+            </a:extLst>
+          </p:cNvPr>
+          <p:cNvPicPr>
+            <a:picLocks noGrp="1" noChangeAspect="1"/>
+          </p:cNvPicPr>
+          <p:nvPr>
+            <p:ph idx="1"/>
+          </p:nvPr>
+        </p:nvPicPr>
+        <p:blipFill>
+          <a:blip r:embed="rId2"/>
+          <a:stretch>
+            <a:fillRect/>
+          </a:stretch>
+        </p:blipFill>
+        <p:spPr>
+          <a:xfrm>
+            <a:off x="186922" y="2231939"/>
+            <a:ext cx="4600978" cy="3703788"/>
+          </a:xfrm>
+          <a:prstGeom prst="rect">
+            <a:avLst/>
+          </a:prstGeom>
+        </p:spPr>
+      </p:pic>
+      <p:pic>
+        <p:nvPicPr>
+          <p:cNvPr id="7" name="Picture 6" descr="A screenshot of a cell phone&#10;&#10;Description automatically generated">
+            <a:extLst>
+              <a:ext uri="{FF2B5EF4-FFF2-40B4-BE49-F238E27FC236}">
+                <a16:creationId xmlns:a16="http://schemas.microsoft.com/office/drawing/2014/main" id="{D89D8660-2F8E-A146-AC42-7C7882BD07F7}"/>
+              </a:ext>
+            </a:extLst>
+          </p:cNvPr>
+          <p:cNvPicPr>
+            <a:picLocks noChangeAspect="1"/>
+          </p:cNvPicPr>
+          <p:nvPr/>
+        </p:nvPicPr>
+        <p:blipFill>
+          <a:blip r:embed="rId3"/>
+          <a:stretch>
+            <a:fillRect/>
+          </a:stretch>
+        </p:blipFill>
+        <p:spPr>
+          <a:xfrm>
+            <a:off x="4352522" y="2301317"/>
+            <a:ext cx="4753378" cy="3565032"/>
+          </a:xfrm>
+          <a:prstGeom prst="rect">
+            <a:avLst/>
+          </a:prstGeom>
+        </p:spPr>
+      </p:pic>
+    </p:spTree>
+    <p:extLst>
+      <p:ext uri="{BB962C8B-B14F-4D97-AF65-F5344CB8AC3E}">
+        <p14:creationId xmlns:p14="http://schemas.microsoft.com/office/powerpoint/2010/main" val="2608042129"/>
+      </p:ext>
+    </p:extLst>
+  </p:cSld>
+  <p:clrMapOvr>
+    <a:masterClrMapping/>
+  </p:clrMapOvr>
+</p:sld>
+</file>
+
+<file path=ppt/slides/slide7.xml><?xml version="1.0" encoding="utf-8"?>
+<p:sld xmlns:a="http://schemas.openxmlformats.org/drawingml/2006/main" xmlns:r="http://schemas.openxmlformats.org/officeDocument/2006/relationships" xmlns:p="http://schemas.openxmlformats.org/presentationml/2006/main">
+  <p:cSld>
+    <p:spTree>
+      <p:nvGrpSpPr>
+        <p:cNvPr id="1" name=""/>
+        <p:cNvGrpSpPr/>
+        <p:nvPr/>
+      </p:nvGrpSpPr>
+      <p:grpSpPr>
+        <a:xfrm>
+          <a:off x="0" y="0"/>
+          <a:ext cx="0" cy="0"/>
+          <a:chOff x="0" y="0"/>
+          <a:chExt cx="0" cy="0"/>
+        </a:xfrm>
+      </p:grpSpPr>
+      <p:sp>
+        <p:nvSpPr>
+          <p:cNvPr id="2" name="Title 1">
+            <a:extLst>
+              <a:ext uri="{FF2B5EF4-FFF2-40B4-BE49-F238E27FC236}">
+                <a16:creationId xmlns:a16="http://schemas.microsoft.com/office/drawing/2014/main" id="{3697B7BF-5832-4040-9E5C-CA361CB62E7D}"/>
+              </a:ext>
+            </a:extLst>
+          </p:cNvPr>
+          <p:cNvSpPr>
+            <a:spLocks noGrp="1"/>
+          </p:cNvSpPr>
+          <p:nvPr>
+            <p:ph type="title"/>
+          </p:nvPr>
+        </p:nvSpPr>
+        <p:spPr/>
+        <p:txBody>
+          <a:bodyPr/>
+          <a:lstStyle/>
+          <a:p>
+            <a:r>
+              <a:rPr lang="en-US" b="1" dirty="0"/>
+              <a:t>Examples</a:t>
+            </a:r>
+          </a:p>
+        </p:txBody>
+      </p:sp>
+      <p:pic>
+        <p:nvPicPr>
+          <p:cNvPr id="5" name="Content Placeholder 4" descr="A close up of a piece of paper&#10;&#10;Description automatically generated">
+            <a:extLst>
+              <a:ext uri="{FF2B5EF4-FFF2-40B4-BE49-F238E27FC236}">
+                <a16:creationId xmlns:a16="http://schemas.microsoft.com/office/drawing/2014/main" id="{2B5E4FEB-CEB1-BA43-8265-8008B46B2F59}"/>
+              </a:ext>
+            </a:extLst>
+          </p:cNvPr>
+          <p:cNvPicPr>
+            <a:picLocks noGrp="1" noChangeAspect="1"/>
+          </p:cNvPicPr>
+          <p:nvPr>
+            <p:ph idx="1"/>
+          </p:nvPr>
+        </p:nvPicPr>
+        <p:blipFill>
+          <a:blip r:embed="rId2"/>
+          <a:stretch>
+            <a:fillRect/>
+          </a:stretch>
+        </p:blipFill>
+        <p:spPr>
+          <a:xfrm>
+            <a:off x="1371600" y="1219200"/>
+            <a:ext cx="5562600" cy="4171950"/>
+          </a:xfrm>
+        </p:spPr>
+      </p:pic>
+    </p:spTree>
+    <p:extLst>
+      <p:ext uri="{BB962C8B-B14F-4D97-AF65-F5344CB8AC3E}">
+        <p14:creationId xmlns:p14="http://schemas.microsoft.com/office/powerpoint/2010/main" val="4014725881"/>
+      </p:ext>
+    </p:extLst>
   </p:cSld>
   <p:clrMapOvr>
     <a:masterClrMapping/>

</xml_diff>